<commit_message>
updated PPT for presentation
</commit_message>
<xml_diff>
--- a/Neural Beer_Working_042318.pptx
+++ b/Neural Beer_Working_042318.pptx
@@ -5,7 +5,7 @@
     <p:sldMasterId id="2147483648" r:id="rId1"/>
   </p:sldMasterIdLst>
   <p:notesMasterIdLst>
-    <p:notesMasterId r:id="rId16"/>
+    <p:notesMasterId r:id="rId17"/>
   </p:notesMasterIdLst>
   <p:sldIdLst>
     <p:sldId id="256" r:id="rId2"/>
@@ -18,10 +18,11 @@
     <p:sldId id="264" r:id="rId9"/>
     <p:sldId id="266" r:id="rId10"/>
     <p:sldId id="265" r:id="rId11"/>
-    <p:sldId id="268" r:id="rId12"/>
-    <p:sldId id="269" r:id="rId13"/>
-    <p:sldId id="267" r:id="rId14"/>
-    <p:sldId id="262" r:id="rId15"/>
+    <p:sldId id="269" r:id="rId12"/>
+    <p:sldId id="268" r:id="rId13"/>
+    <p:sldId id="271" r:id="rId14"/>
+    <p:sldId id="267" r:id="rId15"/>
+    <p:sldId id="262" r:id="rId16"/>
   </p:sldIdLst>
   <p:sldSz cx="12192000" cy="6858000"/>
   <p:notesSz cx="6858000" cy="9144000"/>
@@ -120,6 +121,11 @@
       </a:defRPr>
     </a:lvl9pPr>
   </p:defaultTextStyle>
+  <p:extLst>
+    <p:ext uri="{EFAFB233-063F-42B5-8137-9DF3F51BA10A}">
+      <p15:sldGuideLst xmlns:p15="http://schemas.microsoft.com/office/powerpoint/2012/main"/>
+    </p:ext>
+  </p:extLst>
 </p:presentation>
 </file>
 
@@ -205,7 +211,7 @@
           <a:p>
             <a:fld id="{919AAA9A-09E4-4E4F-BCA7-24749F7F5C2B}" type="datetimeFigureOut">
               <a:rPr lang="en-US" smtClean="0"/>
-              <a:t>4/23/2018</a:t>
+              <a:t>4/25/2018</a:t>
             </a:fld>
             <a:endParaRPr lang="en-US"/>
           </a:p>
@@ -517,8 +523,12 @@
           <a:lstStyle/>
           <a:p>
             <a:r>
-              <a:rPr lang="en-US" dirty="0"/>
-              <a:t>Ethan</a:t>
+              <a:rPr lang="en-US" dirty="0" err="1"/>
+              <a:t>Shey</a:t>
+            </a:r>
+            <a:r>
+              <a:rPr lang="en-US" dirty="0"/>
+              <a:t> – Show off functionality</a:t>
             </a:r>
           </a:p>
         </p:txBody>
@@ -540,7 +550,7 @@
           <a:p>
             <a:fld id="{C73E5DC5-A8AE-4BFC-A664-308D73A98FA0}" type="slidenum">
               <a:rPr lang="en-US" smtClean="0"/>
-              <a:t>6</a:t>
+              <a:t>2</a:t>
             </a:fld>
             <a:endParaRPr lang="en-US"/>
           </a:p>
@@ -549,7 +559,355 @@
     </p:spTree>
     <p:extLst>
       <p:ext uri="{BB962C8B-B14F-4D97-AF65-F5344CB8AC3E}">
-        <p14:creationId xmlns:p14="http://schemas.microsoft.com/office/powerpoint/2010/main" val="490136609"/>
+        <p14:creationId xmlns:p14="http://schemas.microsoft.com/office/powerpoint/2010/main" val="646342825"/>
+      </p:ext>
+    </p:extLst>
+  </p:cSld>
+  <p:clrMapOvr>
+    <a:masterClrMapping/>
+  </p:clrMapOvr>
+</p:notes>
+</file>
+
+<file path=ppt/notesSlides/notesSlide10.xml><?xml version="1.0" encoding="utf-8"?>
+<p:notes xmlns:a="http://schemas.openxmlformats.org/drawingml/2006/main" xmlns:r="http://schemas.openxmlformats.org/officeDocument/2006/relationships" xmlns:p="http://schemas.openxmlformats.org/presentationml/2006/main">
+  <p:cSld>
+    <p:spTree>
+      <p:nvGrpSpPr>
+        <p:cNvPr id="1" name=""/>
+        <p:cNvGrpSpPr/>
+        <p:nvPr/>
+      </p:nvGrpSpPr>
+      <p:grpSpPr>
+        <a:xfrm>
+          <a:off x="0" y="0"/>
+          <a:ext cx="0" cy="0"/>
+          <a:chOff x="0" y="0"/>
+          <a:chExt cx="0" cy="0"/>
+        </a:xfrm>
+      </p:grpSpPr>
+      <p:sp>
+        <p:nvSpPr>
+          <p:cNvPr id="2" name="Slide Image Placeholder 1"/>
+          <p:cNvSpPr>
+            <a:spLocks noGrp="1" noRot="1" noChangeAspect="1"/>
+          </p:cNvSpPr>
+          <p:nvPr>
+            <p:ph type="sldImg"/>
+          </p:nvPr>
+        </p:nvSpPr>
+        <p:spPr/>
+      </p:sp>
+      <p:sp>
+        <p:nvSpPr>
+          <p:cNvPr id="3" name="Notes Placeholder 2"/>
+          <p:cNvSpPr>
+            <a:spLocks noGrp="1"/>
+          </p:cNvSpPr>
+          <p:nvPr>
+            <p:ph type="body" idx="1"/>
+          </p:nvPr>
+        </p:nvSpPr>
+        <p:spPr/>
+        <p:txBody>
+          <a:bodyPr/>
+          <a:lstStyle/>
+          <a:p>
+            <a:r>
+              <a:rPr lang="en-US" dirty="0"/>
+              <a:t>Arne</a:t>
+            </a:r>
+          </a:p>
+        </p:txBody>
+      </p:sp>
+      <p:sp>
+        <p:nvSpPr>
+          <p:cNvPr id="4" name="Slide Number Placeholder 3"/>
+          <p:cNvSpPr>
+            <a:spLocks noGrp="1"/>
+          </p:cNvSpPr>
+          <p:nvPr>
+            <p:ph type="sldNum" sz="quarter" idx="10"/>
+          </p:nvPr>
+        </p:nvSpPr>
+        <p:spPr/>
+        <p:txBody>
+          <a:bodyPr/>
+          <a:lstStyle/>
+          <a:p>
+            <a:fld id="{C73E5DC5-A8AE-4BFC-A664-308D73A98FA0}" type="slidenum">
+              <a:rPr lang="en-US" smtClean="0"/>
+              <a:t>11</a:t>
+            </a:fld>
+            <a:endParaRPr lang="en-US"/>
+          </a:p>
+        </p:txBody>
+      </p:sp>
+    </p:spTree>
+    <p:extLst>
+      <p:ext uri="{BB962C8B-B14F-4D97-AF65-F5344CB8AC3E}">
+        <p14:creationId xmlns:p14="http://schemas.microsoft.com/office/powerpoint/2010/main" val="886377112"/>
+      </p:ext>
+    </p:extLst>
+  </p:cSld>
+  <p:clrMapOvr>
+    <a:masterClrMapping/>
+  </p:clrMapOvr>
+</p:notes>
+</file>
+
+<file path=ppt/notesSlides/notesSlide11.xml><?xml version="1.0" encoding="utf-8"?>
+<p:notes xmlns:a="http://schemas.openxmlformats.org/drawingml/2006/main" xmlns:r="http://schemas.openxmlformats.org/officeDocument/2006/relationships" xmlns:p="http://schemas.openxmlformats.org/presentationml/2006/main">
+  <p:cSld>
+    <p:spTree>
+      <p:nvGrpSpPr>
+        <p:cNvPr id="1" name=""/>
+        <p:cNvGrpSpPr/>
+        <p:nvPr/>
+      </p:nvGrpSpPr>
+      <p:grpSpPr>
+        <a:xfrm>
+          <a:off x="0" y="0"/>
+          <a:ext cx="0" cy="0"/>
+          <a:chOff x="0" y="0"/>
+          <a:chExt cx="0" cy="0"/>
+        </a:xfrm>
+      </p:grpSpPr>
+      <p:sp>
+        <p:nvSpPr>
+          <p:cNvPr id="2" name="Slide Image Placeholder 1"/>
+          <p:cNvSpPr>
+            <a:spLocks noGrp="1" noRot="1" noChangeAspect="1"/>
+          </p:cNvSpPr>
+          <p:nvPr>
+            <p:ph type="sldImg"/>
+          </p:nvPr>
+        </p:nvSpPr>
+        <p:spPr/>
+      </p:sp>
+      <p:sp>
+        <p:nvSpPr>
+          <p:cNvPr id="3" name="Notes Placeholder 2"/>
+          <p:cNvSpPr>
+            <a:spLocks noGrp="1"/>
+          </p:cNvSpPr>
+          <p:nvPr>
+            <p:ph type="body" idx="1"/>
+          </p:nvPr>
+        </p:nvSpPr>
+        <p:spPr/>
+        <p:txBody>
+          <a:bodyPr/>
+          <a:lstStyle/>
+          <a:p>
+            <a:r>
+              <a:rPr lang="en-US" dirty="0"/>
+              <a:t>Brian</a:t>
+            </a:r>
+          </a:p>
+        </p:txBody>
+      </p:sp>
+      <p:sp>
+        <p:nvSpPr>
+          <p:cNvPr id="4" name="Slide Number Placeholder 3"/>
+          <p:cNvSpPr>
+            <a:spLocks noGrp="1"/>
+          </p:cNvSpPr>
+          <p:nvPr>
+            <p:ph type="sldNum" sz="quarter" idx="10"/>
+          </p:nvPr>
+        </p:nvSpPr>
+        <p:spPr/>
+        <p:txBody>
+          <a:bodyPr/>
+          <a:lstStyle/>
+          <a:p>
+            <a:fld id="{C73E5DC5-A8AE-4BFC-A664-308D73A98FA0}" type="slidenum">
+              <a:rPr lang="en-US" smtClean="0"/>
+              <a:t>12</a:t>
+            </a:fld>
+            <a:endParaRPr lang="en-US"/>
+          </a:p>
+        </p:txBody>
+      </p:sp>
+    </p:spTree>
+    <p:extLst>
+      <p:ext uri="{BB962C8B-B14F-4D97-AF65-F5344CB8AC3E}">
+        <p14:creationId xmlns:p14="http://schemas.microsoft.com/office/powerpoint/2010/main" val="1541522173"/>
+      </p:ext>
+    </p:extLst>
+  </p:cSld>
+  <p:clrMapOvr>
+    <a:masterClrMapping/>
+  </p:clrMapOvr>
+</p:notes>
+</file>
+
+<file path=ppt/notesSlides/notesSlide12.xml><?xml version="1.0" encoding="utf-8"?>
+<p:notes xmlns:a="http://schemas.openxmlformats.org/drawingml/2006/main" xmlns:r="http://schemas.openxmlformats.org/officeDocument/2006/relationships" xmlns:p="http://schemas.openxmlformats.org/presentationml/2006/main">
+  <p:cSld>
+    <p:spTree>
+      <p:nvGrpSpPr>
+        <p:cNvPr id="1" name=""/>
+        <p:cNvGrpSpPr/>
+        <p:nvPr/>
+      </p:nvGrpSpPr>
+      <p:grpSpPr>
+        <a:xfrm>
+          <a:off x="0" y="0"/>
+          <a:ext cx="0" cy="0"/>
+          <a:chOff x="0" y="0"/>
+          <a:chExt cx="0" cy="0"/>
+        </a:xfrm>
+      </p:grpSpPr>
+      <p:sp>
+        <p:nvSpPr>
+          <p:cNvPr id="2" name="Slide Image Placeholder 1"/>
+          <p:cNvSpPr>
+            <a:spLocks noGrp="1" noRot="1" noChangeAspect="1"/>
+          </p:cNvSpPr>
+          <p:nvPr>
+            <p:ph type="sldImg"/>
+          </p:nvPr>
+        </p:nvSpPr>
+        <p:spPr/>
+      </p:sp>
+      <p:sp>
+        <p:nvSpPr>
+          <p:cNvPr id="3" name="Notes Placeholder 2"/>
+          <p:cNvSpPr>
+            <a:spLocks noGrp="1"/>
+          </p:cNvSpPr>
+          <p:nvPr>
+            <p:ph type="body" idx="1"/>
+          </p:nvPr>
+        </p:nvSpPr>
+        <p:spPr/>
+        <p:txBody>
+          <a:bodyPr/>
+          <a:lstStyle/>
+          <a:p>
+            <a:r>
+              <a:rPr lang="en-US" dirty="0"/>
+              <a:t>Brian</a:t>
+            </a:r>
+          </a:p>
+        </p:txBody>
+      </p:sp>
+      <p:sp>
+        <p:nvSpPr>
+          <p:cNvPr id="4" name="Slide Number Placeholder 3"/>
+          <p:cNvSpPr>
+            <a:spLocks noGrp="1"/>
+          </p:cNvSpPr>
+          <p:nvPr>
+            <p:ph type="sldNum" sz="quarter" idx="10"/>
+          </p:nvPr>
+        </p:nvSpPr>
+        <p:spPr/>
+        <p:txBody>
+          <a:bodyPr/>
+          <a:lstStyle/>
+          <a:p>
+            <a:fld id="{C73E5DC5-A8AE-4BFC-A664-308D73A98FA0}" type="slidenum">
+              <a:rPr lang="en-US" smtClean="0"/>
+              <a:t>13</a:t>
+            </a:fld>
+            <a:endParaRPr lang="en-US"/>
+          </a:p>
+        </p:txBody>
+      </p:sp>
+    </p:spTree>
+    <p:extLst>
+      <p:ext uri="{BB962C8B-B14F-4D97-AF65-F5344CB8AC3E}">
+        <p14:creationId xmlns:p14="http://schemas.microsoft.com/office/powerpoint/2010/main" val="3141734705"/>
+      </p:ext>
+    </p:extLst>
+  </p:cSld>
+  <p:clrMapOvr>
+    <a:masterClrMapping/>
+  </p:clrMapOvr>
+</p:notes>
+</file>
+
+<file path=ppt/notesSlides/notesSlide13.xml><?xml version="1.0" encoding="utf-8"?>
+<p:notes xmlns:a="http://schemas.openxmlformats.org/drawingml/2006/main" xmlns:r="http://schemas.openxmlformats.org/officeDocument/2006/relationships" xmlns:p="http://schemas.openxmlformats.org/presentationml/2006/main">
+  <p:cSld>
+    <p:spTree>
+      <p:nvGrpSpPr>
+        <p:cNvPr id="1" name=""/>
+        <p:cNvGrpSpPr/>
+        <p:nvPr/>
+      </p:nvGrpSpPr>
+      <p:grpSpPr>
+        <a:xfrm>
+          <a:off x="0" y="0"/>
+          <a:ext cx="0" cy="0"/>
+          <a:chOff x="0" y="0"/>
+          <a:chExt cx="0" cy="0"/>
+        </a:xfrm>
+      </p:grpSpPr>
+      <p:sp>
+        <p:nvSpPr>
+          <p:cNvPr id="2" name="Slide Image Placeholder 1"/>
+          <p:cNvSpPr>
+            <a:spLocks noGrp="1" noRot="1" noChangeAspect="1"/>
+          </p:cNvSpPr>
+          <p:nvPr>
+            <p:ph type="sldImg"/>
+          </p:nvPr>
+        </p:nvSpPr>
+        <p:spPr/>
+      </p:sp>
+      <p:sp>
+        <p:nvSpPr>
+          <p:cNvPr id="3" name="Notes Placeholder 2"/>
+          <p:cNvSpPr>
+            <a:spLocks noGrp="1"/>
+          </p:cNvSpPr>
+          <p:nvPr>
+            <p:ph type="body" idx="1"/>
+          </p:nvPr>
+        </p:nvSpPr>
+        <p:spPr/>
+        <p:txBody>
+          <a:bodyPr/>
+          <a:lstStyle/>
+          <a:p>
+            <a:r>
+              <a:rPr lang="en-US" dirty="0"/>
+              <a:t>All?</a:t>
+            </a:r>
+          </a:p>
+        </p:txBody>
+      </p:sp>
+      <p:sp>
+        <p:nvSpPr>
+          <p:cNvPr id="4" name="Slide Number Placeholder 3"/>
+          <p:cNvSpPr>
+            <a:spLocks noGrp="1"/>
+          </p:cNvSpPr>
+          <p:nvPr>
+            <p:ph type="sldNum" sz="quarter" idx="10"/>
+          </p:nvPr>
+        </p:nvSpPr>
+        <p:spPr/>
+        <p:txBody>
+          <a:bodyPr/>
+          <a:lstStyle/>
+          <a:p>
+            <a:fld id="{C73E5DC5-A8AE-4BFC-A664-308D73A98FA0}" type="slidenum">
+              <a:rPr lang="en-US" smtClean="0"/>
+              <a:t>14</a:t>
+            </a:fld>
+            <a:endParaRPr lang="en-US"/>
+          </a:p>
+        </p:txBody>
+      </p:sp>
+    </p:spTree>
+    <p:extLst>
+      <p:ext uri="{BB962C8B-B14F-4D97-AF65-F5344CB8AC3E}">
+        <p14:creationId xmlns:p14="http://schemas.microsoft.com/office/powerpoint/2010/main" val="1882334122"/>
       </p:ext>
     </p:extLst>
   </p:cSld>
@@ -603,10 +961,6 @@
           <a:bodyPr/>
           <a:lstStyle/>
           <a:p>
-            <a:r>
-              <a:rPr lang="en-US" dirty="0" err="1"/>
-              <a:t>Shey</a:t>
-            </a:r>
             <a:endParaRPr lang="en-US" dirty="0"/>
           </a:p>
         </p:txBody>
@@ -628,7 +982,7 @@
           <a:p>
             <a:fld id="{C73E5DC5-A8AE-4BFC-A664-308D73A98FA0}" type="slidenum">
               <a:rPr lang="en-US" smtClean="0"/>
-              <a:t>7</a:t>
+              <a:t>3</a:t>
             </a:fld>
             <a:endParaRPr lang="en-US"/>
           </a:p>
@@ -637,7 +991,7 @@
     </p:spTree>
     <p:extLst>
       <p:ext uri="{BB962C8B-B14F-4D97-AF65-F5344CB8AC3E}">
-        <p14:creationId xmlns:p14="http://schemas.microsoft.com/office/powerpoint/2010/main" val="2017323956"/>
+        <p14:creationId xmlns:p14="http://schemas.microsoft.com/office/powerpoint/2010/main" val="1785684600"/>
       </p:ext>
     </p:extLst>
   </p:cSld>
@@ -692,9 +1046,10 @@
           <a:lstStyle/>
           <a:p>
             <a:r>
-              <a:rPr lang="en-US" dirty="0"/>
-              <a:t>Arne</a:t>
-            </a:r>
+              <a:rPr lang="en-US" dirty="0" err="1"/>
+              <a:t>Shey</a:t>
+            </a:r>
+            <a:endParaRPr lang="en-US" dirty="0"/>
           </a:p>
         </p:txBody>
       </p:sp>
@@ -715,7 +1070,7 @@
           <a:p>
             <a:fld id="{C73E5DC5-A8AE-4BFC-A664-308D73A98FA0}" type="slidenum">
               <a:rPr lang="en-US" smtClean="0"/>
-              <a:t>8</a:t>
+              <a:t>4</a:t>
             </a:fld>
             <a:endParaRPr lang="en-US"/>
           </a:p>
@@ -724,7 +1079,7 @@
     </p:spTree>
     <p:extLst>
       <p:ext uri="{BB962C8B-B14F-4D97-AF65-F5344CB8AC3E}">
-        <p14:creationId xmlns:p14="http://schemas.microsoft.com/office/powerpoint/2010/main" val="3765770207"/>
+        <p14:creationId xmlns:p14="http://schemas.microsoft.com/office/powerpoint/2010/main" val="2856167754"/>
       </p:ext>
     </p:extLst>
   </p:cSld>
@@ -780,7 +1135,7 @@
           <a:p>
             <a:r>
               <a:rPr lang="en-US" dirty="0"/>
-              <a:t>Arne, except Ethan picks up the reason that we abandoned (issues with accounting for Brews, Views with the given time parameters)</a:t>
+              <a:t>Ethan</a:t>
             </a:r>
           </a:p>
         </p:txBody>
@@ -802,7 +1157,7 @@
           <a:p>
             <a:fld id="{C73E5DC5-A8AE-4BFC-A664-308D73A98FA0}" type="slidenum">
               <a:rPr lang="en-US" smtClean="0"/>
-              <a:t>9</a:t>
+              <a:t>5</a:t>
             </a:fld>
             <a:endParaRPr lang="en-US"/>
           </a:p>
@@ -811,7 +1166,7 @@
     </p:spTree>
     <p:extLst>
       <p:ext uri="{BB962C8B-B14F-4D97-AF65-F5344CB8AC3E}">
-        <p14:creationId xmlns:p14="http://schemas.microsoft.com/office/powerpoint/2010/main" val="911550436"/>
+        <p14:creationId xmlns:p14="http://schemas.microsoft.com/office/powerpoint/2010/main" val="3934899366"/>
       </p:ext>
     </p:extLst>
   </p:cSld>
@@ -867,15 +1222,356 @@
           <a:p>
             <a:r>
               <a:rPr lang="en-US" dirty="0"/>
-              <a:t>Arne to go through the orange boxes. I’ll explain the manual consolidation then turn it over to Brian for </a:t>
-            </a:r>
+              <a:t>Ethan</a:t>
+            </a:r>
+          </a:p>
+        </p:txBody>
+      </p:sp>
+      <p:sp>
+        <p:nvSpPr>
+          <p:cNvPr id="4" name="Slide Number Placeholder 3"/>
+          <p:cNvSpPr>
+            <a:spLocks noGrp="1"/>
+          </p:cNvSpPr>
+          <p:nvPr>
+            <p:ph type="sldNum" sz="quarter" idx="10"/>
+          </p:nvPr>
+        </p:nvSpPr>
+        <p:spPr/>
+        <p:txBody>
+          <a:bodyPr/>
+          <a:lstStyle/>
+          <a:p>
+            <a:fld id="{C73E5DC5-A8AE-4BFC-A664-308D73A98FA0}" type="slidenum">
+              <a:rPr lang="en-US" smtClean="0"/>
+              <a:t>6</a:t>
+            </a:fld>
+            <a:endParaRPr lang="en-US"/>
+          </a:p>
+        </p:txBody>
+      </p:sp>
+    </p:spTree>
+    <p:extLst>
+      <p:ext uri="{BB962C8B-B14F-4D97-AF65-F5344CB8AC3E}">
+        <p14:creationId xmlns:p14="http://schemas.microsoft.com/office/powerpoint/2010/main" val="490136609"/>
+      </p:ext>
+    </p:extLst>
+  </p:cSld>
+  <p:clrMapOvr>
+    <a:masterClrMapping/>
+  </p:clrMapOvr>
+</p:notes>
+</file>
+
+<file path=ppt/notesSlides/notesSlide6.xml><?xml version="1.0" encoding="utf-8"?>
+<p:notes xmlns:a="http://schemas.openxmlformats.org/drawingml/2006/main" xmlns:r="http://schemas.openxmlformats.org/officeDocument/2006/relationships" xmlns:p="http://schemas.openxmlformats.org/presentationml/2006/main">
+  <p:cSld>
+    <p:spTree>
+      <p:nvGrpSpPr>
+        <p:cNvPr id="1" name=""/>
+        <p:cNvGrpSpPr/>
+        <p:nvPr/>
+      </p:nvGrpSpPr>
+      <p:grpSpPr>
+        <a:xfrm>
+          <a:off x="0" y="0"/>
+          <a:ext cx="0" cy="0"/>
+          <a:chOff x="0" y="0"/>
+          <a:chExt cx="0" cy="0"/>
+        </a:xfrm>
+      </p:grpSpPr>
+      <p:sp>
+        <p:nvSpPr>
+          <p:cNvPr id="2" name="Slide Image Placeholder 1"/>
+          <p:cNvSpPr>
+            <a:spLocks noGrp="1" noRot="1" noChangeAspect="1"/>
+          </p:cNvSpPr>
+          <p:nvPr>
+            <p:ph type="sldImg"/>
+          </p:nvPr>
+        </p:nvSpPr>
+        <p:spPr/>
+      </p:sp>
+      <p:sp>
+        <p:nvSpPr>
+          <p:cNvPr id="3" name="Notes Placeholder 2"/>
+          <p:cNvSpPr>
+            <a:spLocks noGrp="1"/>
+          </p:cNvSpPr>
+          <p:nvPr>
+            <p:ph type="body" idx="1"/>
+          </p:nvPr>
+        </p:nvSpPr>
+        <p:spPr/>
+        <p:txBody>
+          <a:bodyPr/>
+          <a:lstStyle/>
+          <a:p>
             <a:r>
               <a:rPr lang="en-US" dirty="0" err="1"/>
-              <a:t>Kmeans</a:t>
-            </a:r>
-            <a:r>
-              <a:rPr lang="en-US" dirty="0"/>
-              <a:t> and results</a:t>
+              <a:t>Shey</a:t>
+            </a:r>
+            <a:endParaRPr lang="en-US" dirty="0"/>
+          </a:p>
+        </p:txBody>
+      </p:sp>
+      <p:sp>
+        <p:nvSpPr>
+          <p:cNvPr id="4" name="Slide Number Placeholder 3"/>
+          <p:cNvSpPr>
+            <a:spLocks noGrp="1"/>
+          </p:cNvSpPr>
+          <p:nvPr>
+            <p:ph type="sldNum" sz="quarter" idx="10"/>
+          </p:nvPr>
+        </p:nvSpPr>
+        <p:spPr/>
+        <p:txBody>
+          <a:bodyPr/>
+          <a:lstStyle/>
+          <a:p>
+            <a:fld id="{C73E5DC5-A8AE-4BFC-A664-308D73A98FA0}" type="slidenum">
+              <a:rPr lang="en-US" smtClean="0"/>
+              <a:t>7</a:t>
+            </a:fld>
+            <a:endParaRPr lang="en-US"/>
+          </a:p>
+        </p:txBody>
+      </p:sp>
+    </p:spTree>
+    <p:extLst>
+      <p:ext uri="{BB962C8B-B14F-4D97-AF65-F5344CB8AC3E}">
+        <p14:creationId xmlns:p14="http://schemas.microsoft.com/office/powerpoint/2010/main" val="2017323956"/>
+      </p:ext>
+    </p:extLst>
+  </p:cSld>
+  <p:clrMapOvr>
+    <a:masterClrMapping/>
+  </p:clrMapOvr>
+</p:notes>
+</file>
+
+<file path=ppt/notesSlides/notesSlide7.xml><?xml version="1.0" encoding="utf-8"?>
+<p:notes xmlns:a="http://schemas.openxmlformats.org/drawingml/2006/main" xmlns:r="http://schemas.openxmlformats.org/officeDocument/2006/relationships" xmlns:p="http://schemas.openxmlformats.org/presentationml/2006/main">
+  <p:cSld>
+    <p:spTree>
+      <p:nvGrpSpPr>
+        <p:cNvPr id="1" name=""/>
+        <p:cNvGrpSpPr/>
+        <p:nvPr/>
+      </p:nvGrpSpPr>
+      <p:grpSpPr>
+        <a:xfrm>
+          <a:off x="0" y="0"/>
+          <a:ext cx="0" cy="0"/>
+          <a:chOff x="0" y="0"/>
+          <a:chExt cx="0" cy="0"/>
+        </a:xfrm>
+      </p:grpSpPr>
+      <p:sp>
+        <p:nvSpPr>
+          <p:cNvPr id="2" name="Slide Image Placeholder 1"/>
+          <p:cNvSpPr>
+            <a:spLocks noGrp="1" noRot="1" noChangeAspect="1"/>
+          </p:cNvSpPr>
+          <p:nvPr>
+            <p:ph type="sldImg"/>
+          </p:nvPr>
+        </p:nvSpPr>
+        <p:spPr/>
+      </p:sp>
+      <p:sp>
+        <p:nvSpPr>
+          <p:cNvPr id="3" name="Notes Placeholder 2"/>
+          <p:cNvSpPr>
+            <a:spLocks noGrp="1"/>
+          </p:cNvSpPr>
+          <p:nvPr>
+            <p:ph type="body" idx="1"/>
+          </p:nvPr>
+        </p:nvSpPr>
+        <p:spPr/>
+        <p:txBody>
+          <a:bodyPr/>
+          <a:lstStyle/>
+          <a:p>
+            <a:r>
+              <a:rPr lang="en-US" dirty="0"/>
+              <a:t>Arne</a:t>
+            </a:r>
+          </a:p>
+        </p:txBody>
+      </p:sp>
+      <p:sp>
+        <p:nvSpPr>
+          <p:cNvPr id="4" name="Slide Number Placeholder 3"/>
+          <p:cNvSpPr>
+            <a:spLocks noGrp="1"/>
+          </p:cNvSpPr>
+          <p:nvPr>
+            <p:ph type="sldNum" sz="quarter" idx="10"/>
+          </p:nvPr>
+        </p:nvSpPr>
+        <p:spPr/>
+        <p:txBody>
+          <a:bodyPr/>
+          <a:lstStyle/>
+          <a:p>
+            <a:fld id="{C73E5DC5-A8AE-4BFC-A664-308D73A98FA0}" type="slidenum">
+              <a:rPr lang="en-US" smtClean="0"/>
+              <a:t>8</a:t>
+            </a:fld>
+            <a:endParaRPr lang="en-US"/>
+          </a:p>
+        </p:txBody>
+      </p:sp>
+    </p:spTree>
+    <p:extLst>
+      <p:ext uri="{BB962C8B-B14F-4D97-AF65-F5344CB8AC3E}">
+        <p14:creationId xmlns:p14="http://schemas.microsoft.com/office/powerpoint/2010/main" val="3765770207"/>
+      </p:ext>
+    </p:extLst>
+  </p:cSld>
+  <p:clrMapOvr>
+    <a:masterClrMapping/>
+  </p:clrMapOvr>
+</p:notes>
+</file>
+
+<file path=ppt/notesSlides/notesSlide8.xml><?xml version="1.0" encoding="utf-8"?>
+<p:notes xmlns:a="http://schemas.openxmlformats.org/drawingml/2006/main" xmlns:r="http://schemas.openxmlformats.org/officeDocument/2006/relationships" xmlns:p="http://schemas.openxmlformats.org/presentationml/2006/main">
+  <p:cSld>
+    <p:spTree>
+      <p:nvGrpSpPr>
+        <p:cNvPr id="1" name=""/>
+        <p:cNvGrpSpPr/>
+        <p:nvPr/>
+      </p:nvGrpSpPr>
+      <p:grpSpPr>
+        <a:xfrm>
+          <a:off x="0" y="0"/>
+          <a:ext cx="0" cy="0"/>
+          <a:chOff x="0" y="0"/>
+          <a:chExt cx="0" cy="0"/>
+        </a:xfrm>
+      </p:grpSpPr>
+      <p:sp>
+        <p:nvSpPr>
+          <p:cNvPr id="2" name="Slide Image Placeholder 1"/>
+          <p:cNvSpPr>
+            <a:spLocks noGrp="1" noRot="1" noChangeAspect="1"/>
+          </p:cNvSpPr>
+          <p:nvPr>
+            <p:ph type="sldImg"/>
+          </p:nvPr>
+        </p:nvSpPr>
+        <p:spPr/>
+      </p:sp>
+      <p:sp>
+        <p:nvSpPr>
+          <p:cNvPr id="3" name="Notes Placeholder 2"/>
+          <p:cNvSpPr>
+            <a:spLocks noGrp="1"/>
+          </p:cNvSpPr>
+          <p:nvPr>
+            <p:ph type="body" idx="1"/>
+          </p:nvPr>
+        </p:nvSpPr>
+        <p:spPr/>
+        <p:txBody>
+          <a:bodyPr/>
+          <a:lstStyle/>
+          <a:p>
+            <a:r>
+              <a:rPr lang="en-US" dirty="0"/>
+              <a:t>Arne, except Ethan picks up the reason that we abandoned (issues with accounting for Brews, Views with the given time parameters)</a:t>
+            </a:r>
+          </a:p>
+        </p:txBody>
+      </p:sp>
+      <p:sp>
+        <p:nvSpPr>
+          <p:cNvPr id="4" name="Slide Number Placeholder 3"/>
+          <p:cNvSpPr>
+            <a:spLocks noGrp="1"/>
+          </p:cNvSpPr>
+          <p:nvPr>
+            <p:ph type="sldNum" sz="quarter" idx="10"/>
+          </p:nvPr>
+        </p:nvSpPr>
+        <p:spPr/>
+        <p:txBody>
+          <a:bodyPr/>
+          <a:lstStyle/>
+          <a:p>
+            <a:fld id="{C73E5DC5-A8AE-4BFC-A664-308D73A98FA0}" type="slidenum">
+              <a:rPr lang="en-US" smtClean="0"/>
+              <a:t>9</a:t>
+            </a:fld>
+            <a:endParaRPr lang="en-US"/>
+          </a:p>
+        </p:txBody>
+      </p:sp>
+    </p:spTree>
+    <p:extLst>
+      <p:ext uri="{BB962C8B-B14F-4D97-AF65-F5344CB8AC3E}">
+        <p14:creationId xmlns:p14="http://schemas.microsoft.com/office/powerpoint/2010/main" val="911550436"/>
+      </p:ext>
+    </p:extLst>
+  </p:cSld>
+  <p:clrMapOvr>
+    <a:masterClrMapping/>
+  </p:clrMapOvr>
+</p:notes>
+</file>
+
+<file path=ppt/notesSlides/notesSlide9.xml><?xml version="1.0" encoding="utf-8"?>
+<p:notes xmlns:a="http://schemas.openxmlformats.org/drawingml/2006/main" xmlns:r="http://schemas.openxmlformats.org/officeDocument/2006/relationships" xmlns:p="http://schemas.openxmlformats.org/presentationml/2006/main">
+  <p:cSld>
+    <p:spTree>
+      <p:nvGrpSpPr>
+        <p:cNvPr id="1" name=""/>
+        <p:cNvGrpSpPr/>
+        <p:nvPr/>
+      </p:nvGrpSpPr>
+      <p:grpSpPr>
+        <a:xfrm>
+          <a:off x="0" y="0"/>
+          <a:ext cx="0" cy="0"/>
+          <a:chOff x="0" y="0"/>
+          <a:chExt cx="0" cy="0"/>
+        </a:xfrm>
+      </p:grpSpPr>
+      <p:sp>
+        <p:nvSpPr>
+          <p:cNvPr id="2" name="Slide Image Placeholder 1"/>
+          <p:cNvSpPr>
+            <a:spLocks noGrp="1" noRot="1" noChangeAspect="1"/>
+          </p:cNvSpPr>
+          <p:nvPr>
+            <p:ph type="sldImg"/>
+          </p:nvPr>
+        </p:nvSpPr>
+        <p:spPr/>
+      </p:sp>
+      <p:sp>
+        <p:nvSpPr>
+          <p:cNvPr id="3" name="Notes Placeholder 2"/>
+          <p:cNvSpPr>
+            <a:spLocks noGrp="1"/>
+          </p:cNvSpPr>
+          <p:nvPr>
+            <p:ph type="body" idx="1"/>
+          </p:nvPr>
+        </p:nvSpPr>
+        <p:spPr/>
+        <p:txBody>
+          <a:bodyPr/>
+          <a:lstStyle/>
+          <a:p>
+            <a:r>
+              <a:rPr lang="en-US" dirty="0"/>
+              <a:t>Arne</a:t>
             </a:r>
           </a:p>
         </p:txBody>
@@ -1190,7 +1886,7 @@
           <a:p>
             <a:fld id="{78ABE3C1-DBE1-495D-B57B-2849774B866A}" type="datetimeFigureOut">
               <a:rPr lang="en-US" dirty="0"/>
-              <a:t>4/23/2018</a:t>
+              <a:t>4/25/2018</a:t>
             </a:fld>
             <a:endParaRPr lang="en-US" dirty="0"/>
           </a:p>
@@ -1599,7 +2295,7 @@
           <a:p>
             <a:fld id="{446C117F-5CCF-4837-BE5F-2B92066CAFAF}" type="datetimeFigureOut">
               <a:rPr lang="en-US" dirty="0"/>
-              <a:t>4/23/2018</a:t>
+              <a:t>4/25/2018</a:t>
             </a:fld>
             <a:endParaRPr lang="en-US" dirty="0"/>
           </a:p>
@@ -1930,7 +2626,7 @@
           <a:p>
             <a:fld id="{84EB90BD-B6CE-46B7-997F-7313B992CCDC}" type="datetimeFigureOut">
               <a:rPr lang="en-US" dirty="0"/>
-              <a:t>4/23/2018</a:t>
+              <a:t>4/25/2018</a:t>
             </a:fld>
             <a:endParaRPr lang="en-US" dirty="0"/>
           </a:p>
@@ -2330,7 +3026,7 @@
           <a:p>
             <a:fld id="{CDB9D11F-B188-461D-B23F-39381795C052}" type="datetimeFigureOut">
               <a:rPr lang="en-US" dirty="0"/>
-              <a:t>4/23/2018</a:t>
+              <a:t>4/25/2018</a:t>
             </a:fld>
             <a:endParaRPr lang="en-US" dirty="0"/>
           </a:p>
@@ -2893,7 +3589,7 @@
           <a:p>
             <a:fld id="{52E6D8D9-55A2-4063-B0F3-121F44549695}" type="datetimeFigureOut">
               <a:rPr lang="en-US" dirty="0"/>
-              <a:t>4/23/2018</a:t>
+              <a:t>4/25/2018</a:t>
             </a:fld>
             <a:endParaRPr lang="en-US" dirty="0"/>
           </a:p>
@@ -3569,7 +4265,7 @@
           <a:p>
             <a:fld id="{D4B24536-994D-4021-A283-9F449C0DB509}" type="datetimeFigureOut">
               <a:rPr lang="en-US" dirty="0"/>
-              <a:t>4/23/2018</a:t>
+              <a:t>4/25/2018</a:t>
             </a:fld>
             <a:endParaRPr lang="en-US" dirty="0"/>
           </a:p>
@@ -4477,7 +5173,7 @@
           <a:p>
             <a:fld id="{3CBBBB78-C96F-47B7-AB17-D852CA960AC9}" type="datetimeFigureOut">
               <a:rPr lang="en-US" dirty="0"/>
-              <a:t>4/23/2018</a:t>
+              <a:t>4/25/2018</a:t>
             </a:fld>
             <a:endParaRPr lang="en-US" dirty="0"/>
           </a:p>
@@ -4785,7 +5481,7 @@
           <a:p>
             <a:fld id="{1FA3F48C-C7C6-4055-9F49-3777875E72AE}" type="datetimeFigureOut">
               <a:rPr lang="en-US" dirty="0"/>
-              <a:t>4/23/2018</a:t>
+              <a:t>4/25/2018</a:t>
             </a:fld>
             <a:endParaRPr lang="en-US" dirty="0"/>
           </a:p>
@@ -5044,7 +5740,7 @@
           <a:p>
             <a:fld id="{6178E61D-D431-422C-9764-11DAFE33AB63}" type="datetimeFigureOut">
               <a:rPr lang="en-US" dirty="0"/>
-              <a:t>4/23/2018</a:t>
+              <a:t>4/25/2018</a:t>
             </a:fld>
             <a:endParaRPr lang="en-US" dirty="0"/>
           </a:p>
@@ -5363,7 +6059,7 @@
           <a:p>
             <a:fld id="{12DE42F4-6EEF-4EF7-8ED4-2208F0F89A08}" type="datetimeFigureOut">
               <a:rPr lang="en-US" dirty="0"/>
-              <a:t>4/23/2018</a:t>
+              <a:t>4/25/2018</a:t>
             </a:fld>
             <a:endParaRPr lang="en-US" dirty="0"/>
           </a:p>
@@ -5794,7 +6490,7 @@
           <a:p>
             <a:fld id="{30578ACC-22D6-47C1-A373-4FD133E34F3C}" type="datetimeFigureOut">
               <a:rPr lang="en-US" dirty="0"/>
-              <a:t>4/23/2018</a:t>
+              <a:t>4/25/2018</a:t>
             </a:fld>
             <a:endParaRPr lang="en-US" dirty="0"/>
           </a:p>
@@ -6212,7 +6908,7 @@
           <a:p>
             <a:fld id="{4E5A6C69-6797-4E8A-BF37-F2C3751466E9}" type="datetimeFigureOut">
               <a:rPr lang="en-US" dirty="0"/>
-              <a:t>4/23/2018</a:t>
+              <a:t>4/25/2018</a:t>
             </a:fld>
             <a:endParaRPr lang="en-US" dirty="0"/>
           </a:p>
@@ -6760,7 +7456,7 @@
           <a:p>
             <a:fld id="{D82014A1-A632-4878-A0D3-F52BA7563730}" type="datetimeFigureOut">
               <a:rPr lang="en-US" dirty="0"/>
-              <a:t>4/23/2018</a:t>
+              <a:t>4/25/2018</a:t>
             </a:fld>
             <a:endParaRPr lang="en-US" dirty="0"/>
           </a:p>
@@ -7012,7 +7708,7 @@
           <a:p>
             <a:fld id="{CE99F462-093F-4566-844B-4C71F2739DA5}" type="datetimeFigureOut">
               <a:rPr lang="en-US" dirty="0"/>
-              <a:t>4/23/2018</a:t>
+              <a:t>4/25/2018</a:t>
             </a:fld>
             <a:endParaRPr lang="en-US" dirty="0"/>
           </a:p>
@@ -7170,7 +7866,7 @@
           <a:p>
             <a:fld id="{3D24A7AC-904D-4781-85BA-7D10C17ED021}" type="datetimeFigureOut">
               <a:rPr lang="en-US" dirty="0"/>
-              <a:t>4/23/2018</a:t>
+              <a:t>4/25/2018</a:t>
             </a:fld>
             <a:endParaRPr lang="en-US" dirty="0"/>
           </a:p>
@@ -7555,7 +8251,7 @@
           <a:p>
             <a:fld id="{E331444B-B92B-4E27-8C94-BB93EAF5CB18}" type="datetimeFigureOut">
               <a:rPr lang="en-US" dirty="0"/>
-              <a:t>4/23/2018</a:t>
+              <a:t>4/25/2018</a:t>
             </a:fld>
             <a:endParaRPr lang="en-US" dirty="0"/>
           </a:p>
@@ -7959,7 +8655,7 @@
           <a:p>
             <a:fld id="{363EFA5E-FA76-400D-B3DC-F0BA90E6D107}" type="datetimeFigureOut">
               <a:rPr lang="en-US" dirty="0"/>
-              <a:t>4/23/2018</a:t>
+              <a:t>4/25/2018</a:t>
             </a:fld>
             <a:endParaRPr lang="en-US" dirty="0"/>
           </a:p>
@@ -8198,7 +8894,7 @@
           <a:p>
             <a:fld id="{9D6E9DEC-419B-4CC5-A080-3B06BD5A8291}" type="datetimeFigureOut">
               <a:rPr lang="en-US" dirty="0"/>
-              <a:t>4/23/2018</a:t>
+              <a:t>4/25/2018</a:t>
             </a:fld>
             <a:endParaRPr lang="en-US" dirty="0"/>
           </a:p>
@@ -9089,25 +9785,17 @@
           <a:p>
             <a:r>
               <a:rPr lang="en-US" dirty="0"/>
-              <a:t>Model Results &amp; Function – </a:t>
-            </a:r>
-            <a:r>
-              <a:rPr lang="en-US" dirty="0" err="1"/>
-              <a:t>KMeans</a:t>
-            </a:r>
-            <a:r>
-              <a:rPr lang="en-US" dirty="0"/>
-              <a:t> Cluster</a:t>
-            </a:r>
-          </a:p>
-        </p:txBody>
-      </p:sp>
-      <p:sp>
-        <p:nvSpPr>
-          <p:cNvPr id="3" name="Content Placeholder 2">
+              <a:t>Model Results &amp; Function – Human Intuitive</a:t>
+            </a:r>
+          </a:p>
+        </p:txBody>
+      </p:sp>
+      <p:sp>
+        <p:nvSpPr>
+          <p:cNvPr id="7" name="Content Placeholder 2">
             <a:extLst>
               <a:ext uri="{FF2B5EF4-FFF2-40B4-BE49-F238E27FC236}">
-                <a16:creationId xmlns:a16="http://schemas.microsoft.com/office/drawing/2014/main" id="{7DC1F34B-8511-4D67-9B66-CD0E2A5250A1}"/>
+                <a16:creationId xmlns:a16="http://schemas.microsoft.com/office/drawing/2014/main" id="{942D892A-0847-4E1C-8D73-DB6C090EBE63}"/>
               </a:ext>
             </a:extLst>
           </p:cNvPr>
@@ -9130,62 +9818,69 @@
           </a:bodyPr>
           <a:lstStyle/>
           <a:p>
-            <a:pPr marL="0" indent="0">
-              <a:buNone/>
-            </a:pPr>
-            <a:r>
-              <a:rPr lang="en-US" b="1" dirty="0"/>
-              <a:t>Talk about stuff: </a:t>
-            </a:r>
-            <a:r>
-              <a:rPr lang="en-US" dirty="0"/>
-              <a:t>Talk about more stuff, not in bold</a:t>
-            </a:r>
-          </a:p>
-          <a:p>
-            <a:pPr marL="0" indent="0">
-              <a:buNone/>
-            </a:pPr>
+            <a:r>
+              <a:rPr lang="en-US" dirty="0"/>
+              <a:t>Manually created 11 “human intuitive categories” by visual scan </a:t>
+            </a:r>
+          </a:p>
+          <a:p>
+            <a:pPr lvl="1"/>
+            <a:r>
+              <a:rPr lang="en-US" dirty="0"/>
+              <a:t>Examples: “Stouts and Porters”, “IPAs and Pale Ales” </a:t>
+            </a:r>
+          </a:p>
+          <a:p>
+            <a:r>
+              <a:rPr lang="en-US" dirty="0"/>
+              <a:t>Fit and tested a model to predict these categories (results shown later)</a:t>
+            </a:r>
+          </a:p>
+          <a:p>
+            <a:pPr lvl="1"/>
+            <a:r>
+              <a:rPr lang="en-US" dirty="0"/>
+              <a:t>3 input parameters, various epochs</a:t>
+            </a:r>
+          </a:p>
+          <a:p>
+            <a:pPr lvl="1"/>
+            <a:r>
+              <a:rPr lang="en-US" dirty="0"/>
+              <a:t>7 input parameters, various epochs</a:t>
+            </a:r>
+          </a:p>
+          <a:p>
+            <a:r>
+              <a:rPr lang="en-US" dirty="0"/>
+              <a:t>Expectations:</a:t>
+            </a:r>
+          </a:p>
+          <a:p>
+            <a:pPr lvl="1"/>
+            <a:r>
+              <a:rPr lang="en-US" dirty="0"/>
+              <a:t>Lower prediction accuracy than </a:t>
+            </a:r>
+            <a:r>
+              <a:rPr lang="en-US" dirty="0" err="1"/>
+              <a:t>KMeans</a:t>
+            </a:r>
             <a:endParaRPr lang="en-US" dirty="0"/>
           </a:p>
           <a:p>
-            <a:pPr marL="0" indent="0">
-              <a:buNone/>
-            </a:pPr>
-            <a:endParaRPr lang="en-US" dirty="0"/>
-          </a:p>
-          <a:p>
-            <a:pPr marL="0" indent="0">
-              <a:buNone/>
-            </a:pPr>
-            <a:endParaRPr lang="en-US" dirty="0"/>
-          </a:p>
-          <a:p>
-            <a:pPr marL="0" indent="0">
-              <a:buNone/>
-            </a:pPr>
-            <a:endParaRPr lang="en-US" dirty="0"/>
-          </a:p>
-          <a:p>
-            <a:pPr marL="0" indent="0">
-              <a:buNone/>
-            </a:pPr>
-            <a:r>
-              <a:rPr lang="en-US" b="1" dirty="0"/>
-              <a:t>Results</a:t>
-            </a:r>
-            <a:r>
-              <a:rPr lang="en-US" dirty="0"/>
-              <a:t>:</a:t>
-            </a:r>
-            <a:endParaRPr lang="en-US" sz="2000" dirty="0"/>
+            <a:pPr lvl="1"/>
+            <a:r>
+              <a:rPr lang="en-US" dirty="0"/>
+              <a:t>More meaningful output re: style names </a:t>
+            </a:r>
           </a:p>
         </p:txBody>
       </p:sp>
     </p:spTree>
     <p:extLst>
       <p:ext uri="{BB962C8B-B14F-4D97-AF65-F5344CB8AC3E}">
-        <p14:creationId xmlns:p14="http://schemas.microsoft.com/office/powerpoint/2010/main" val="136412404"/>
+        <p14:creationId xmlns:p14="http://schemas.microsoft.com/office/powerpoint/2010/main" val="2523977036"/>
       </p:ext>
     </p:extLst>
   </p:cSld>
@@ -9235,17 +9930,25 @@
           <a:p>
             <a:r>
               <a:rPr lang="en-US" dirty="0"/>
-              <a:t>Model Results &amp; Function – Human Intuitive</a:t>
-            </a:r>
-          </a:p>
-        </p:txBody>
-      </p:sp>
-      <p:sp>
-        <p:nvSpPr>
-          <p:cNvPr id="7" name="Content Placeholder 2">
+              <a:t>Model Results &amp; Function – </a:t>
+            </a:r>
+            <a:r>
+              <a:rPr lang="en-US" dirty="0" err="1"/>
+              <a:t>KMeans</a:t>
+            </a:r>
+            <a:r>
+              <a:rPr lang="en-US" dirty="0"/>
+              <a:t> Cluster</a:t>
+            </a:r>
+          </a:p>
+        </p:txBody>
+      </p:sp>
+      <p:sp>
+        <p:nvSpPr>
+          <p:cNvPr id="3" name="Content Placeholder 2">
             <a:extLst>
               <a:ext uri="{FF2B5EF4-FFF2-40B4-BE49-F238E27FC236}">
-                <a16:creationId xmlns:a16="http://schemas.microsoft.com/office/drawing/2014/main" id="{942D892A-0847-4E1C-8D73-DB6C090EBE63}"/>
+                <a16:creationId xmlns:a16="http://schemas.microsoft.com/office/drawing/2014/main" id="{7DC1F34B-8511-4D67-9B66-CD0E2A5250A1}"/>
               </a:ext>
             </a:extLst>
           </p:cNvPr>
@@ -9264,21 +9967,81 @@
         </p:spPr>
         <p:txBody>
           <a:bodyPr>
-            <a:normAutofit/>
+            <a:normAutofit fontScale="92500" lnSpcReduction="20000"/>
           </a:bodyPr>
           <a:lstStyle/>
           <a:p>
-            <a:pPr marL="0" indent="0">
-              <a:buNone/>
-            </a:pPr>
-            <a:r>
-              <a:rPr lang="en-US" b="1" dirty="0"/>
-              <a:t>Talk about stuff: </a:t>
-            </a:r>
-            <a:r>
-              <a:rPr lang="en-US" dirty="0"/>
-              <a:t>Talk about more stuff, not in bold</a:t>
-            </a:r>
+            <a:r>
+              <a:rPr lang="en-US" dirty="0"/>
+              <a:t>Created 13 clusters (resulting clusters not “human intuitive”)</a:t>
+            </a:r>
+          </a:p>
+          <a:p>
+            <a:r>
+              <a:rPr lang="en-US" dirty="0"/>
+              <a:t>Prepared a scatterplot matrix to view relationships</a:t>
+            </a:r>
+          </a:p>
+          <a:p>
+            <a:endParaRPr lang="en-US" dirty="0"/>
+          </a:p>
+          <a:p>
+            <a:endParaRPr lang="en-US" dirty="0"/>
+          </a:p>
+          <a:p>
+            <a:endParaRPr lang="en-US" dirty="0"/>
+          </a:p>
+          <a:p>
+            <a:endParaRPr lang="en-US" dirty="0"/>
+          </a:p>
+          <a:p>
+            <a:endParaRPr lang="en-US" dirty="0"/>
+          </a:p>
+          <a:p>
+            <a:r>
+              <a:rPr lang="en-US" dirty="0"/>
+              <a:t>Fit and tested a model to predict cluster</a:t>
+            </a:r>
+          </a:p>
+          <a:p>
+            <a:pPr lvl="1"/>
+            <a:r>
+              <a:rPr lang="en-US" dirty="0"/>
+              <a:t>3 input parameters, various epochs</a:t>
+            </a:r>
+          </a:p>
+          <a:p>
+            <a:pPr lvl="1"/>
+            <a:r>
+              <a:rPr lang="en-US" dirty="0"/>
+              <a:t>7 input parameters, various epochs</a:t>
+            </a:r>
+          </a:p>
+          <a:p>
+            <a:r>
+              <a:rPr lang="en-US" dirty="0"/>
+              <a:t>Expectations:</a:t>
+            </a:r>
+          </a:p>
+          <a:p>
+            <a:pPr lvl="1"/>
+            <a:r>
+              <a:rPr lang="en-US" dirty="0"/>
+              <a:t>Higher prediction accuracy than human intuitive (useful for recommendations)</a:t>
+            </a:r>
+          </a:p>
+          <a:p>
+            <a:pPr lvl="1"/>
+            <a:r>
+              <a:rPr lang="en-US" dirty="0"/>
+              <a:t>Less useful output for style predictor</a:t>
+            </a:r>
+          </a:p>
+          <a:p>
+            <a:endParaRPr lang="en-US" dirty="0"/>
+          </a:p>
+          <a:p>
+            <a:endParaRPr lang="en-US" dirty="0"/>
           </a:p>
           <a:p>
             <a:pPr marL="0" indent="0">
@@ -9292,38 +10055,47 @@
             </a:pPr>
             <a:endParaRPr lang="en-US" dirty="0"/>
           </a:p>
-          <a:p>
-            <a:pPr marL="0" indent="0">
-              <a:buNone/>
-            </a:pPr>
-            <a:endParaRPr lang="en-US" dirty="0"/>
-          </a:p>
-          <a:p>
-            <a:pPr marL="0" indent="0">
-              <a:buNone/>
-            </a:pPr>
-            <a:endParaRPr lang="en-US" dirty="0"/>
-          </a:p>
-          <a:p>
-            <a:pPr marL="0" indent="0">
-              <a:buNone/>
-            </a:pPr>
-            <a:r>
-              <a:rPr lang="en-US" b="1" dirty="0"/>
-              <a:t>Results</a:t>
-            </a:r>
-            <a:r>
-              <a:rPr lang="en-US" dirty="0"/>
-              <a:t>:</a:t>
-            </a:r>
-            <a:endParaRPr lang="en-US" sz="2000" dirty="0"/>
-          </a:p>
-        </p:txBody>
-      </p:sp>
+        </p:txBody>
+      </p:sp>
+      <p:pic>
+        <p:nvPicPr>
+          <p:cNvPr id="6" name="Picture 5" descr="A close up of a map&#10;&#10;Description generated with very high confidence">
+            <a:extLst>
+              <a:ext uri="{FF2B5EF4-FFF2-40B4-BE49-F238E27FC236}">
+                <a16:creationId xmlns:a16="http://schemas.microsoft.com/office/drawing/2014/main" id="{47ED297A-722D-4820-A658-ED47720C5EDA}"/>
+              </a:ext>
+            </a:extLst>
+          </p:cNvPr>
+          <p:cNvPicPr>
+            <a:picLocks noChangeAspect="1"/>
+          </p:cNvPicPr>
+          <p:nvPr/>
+        </p:nvPicPr>
+        <p:blipFill>
+          <a:blip r:embed="rId3"/>
+          <a:stretch>
+            <a:fillRect/>
+          </a:stretch>
+        </p:blipFill>
+        <p:spPr>
+          <a:xfrm>
+            <a:off x="821095" y="3057811"/>
+            <a:ext cx="5831633" cy="1619898"/>
+          </a:xfrm>
+          <a:prstGeom prst="rect">
+            <a:avLst/>
+          </a:prstGeom>
+          <a:ln>
+            <a:solidFill>
+              <a:schemeClr val="accent1"/>
+            </a:solidFill>
+          </a:ln>
+        </p:spPr>
+      </p:pic>
     </p:spTree>
     <p:extLst>
       <p:ext uri="{BB962C8B-B14F-4D97-AF65-F5344CB8AC3E}">
-        <p14:creationId xmlns:p14="http://schemas.microsoft.com/office/powerpoint/2010/main" val="2523977036"/>
+        <p14:creationId xmlns:p14="http://schemas.microsoft.com/office/powerpoint/2010/main" val="136412404"/>
       </p:ext>
     </p:extLst>
   </p:cSld>
@@ -9355,6 +10127,753 @@
           <p:cNvPr id="2" name="Title 1">
             <a:extLst>
               <a:ext uri="{FF2B5EF4-FFF2-40B4-BE49-F238E27FC236}">
+                <a16:creationId xmlns:a16="http://schemas.microsoft.com/office/drawing/2014/main" id="{534A2B94-5CD0-4C29-B6BD-62666BDA3152}"/>
+              </a:ext>
+            </a:extLst>
+          </p:cNvPr>
+          <p:cNvSpPr>
+            <a:spLocks noGrp="1"/>
+          </p:cNvSpPr>
+          <p:nvPr>
+            <p:ph type="title"/>
+          </p:nvPr>
+        </p:nvSpPr>
+        <p:spPr/>
+        <p:txBody>
+          <a:bodyPr/>
+          <a:lstStyle/>
+          <a:p>
+            <a:r>
+              <a:rPr lang="en-US" dirty="0"/>
+              <a:t>Model Results &amp; Selection</a:t>
+            </a:r>
+          </a:p>
+        </p:txBody>
+      </p:sp>
+      <p:sp>
+        <p:nvSpPr>
+          <p:cNvPr id="7" name="Content Placeholder 2">
+            <a:extLst>
+              <a:ext uri="{FF2B5EF4-FFF2-40B4-BE49-F238E27FC236}">
+                <a16:creationId xmlns:a16="http://schemas.microsoft.com/office/drawing/2014/main" id="{942D892A-0847-4E1C-8D73-DB6C090EBE63}"/>
+              </a:ext>
+            </a:extLst>
+          </p:cNvPr>
+          <p:cNvSpPr>
+            <a:spLocks noGrp="1"/>
+          </p:cNvSpPr>
+          <p:nvPr>
+            <p:ph idx="1"/>
+          </p:nvPr>
+        </p:nvSpPr>
+        <p:spPr>
+          <a:xfrm>
+            <a:off x="680321" y="2336873"/>
+            <a:ext cx="10917629" cy="4375012"/>
+          </a:xfrm>
+        </p:spPr>
+        <p:txBody>
+          <a:bodyPr>
+            <a:normAutofit lnSpcReduction="10000"/>
+          </a:bodyPr>
+          <a:lstStyle/>
+          <a:p>
+            <a:pPr marL="0" indent="0">
+              <a:buNone/>
+            </a:pPr>
+            <a:endParaRPr lang="en-US" dirty="0"/>
+          </a:p>
+          <a:p>
+            <a:endParaRPr lang="en-US" dirty="0"/>
+          </a:p>
+          <a:p>
+            <a:endParaRPr lang="en-US" dirty="0"/>
+          </a:p>
+          <a:p>
+            <a:endParaRPr lang="en-US" dirty="0"/>
+          </a:p>
+          <a:p>
+            <a:endParaRPr lang="en-US" dirty="0"/>
+          </a:p>
+          <a:p>
+            <a:endParaRPr lang="en-US" dirty="0"/>
+          </a:p>
+          <a:p>
+            <a:r>
+              <a:rPr lang="en-US" dirty="0"/>
+              <a:t>Expectations generally matched reality</a:t>
+            </a:r>
+          </a:p>
+          <a:p>
+            <a:pPr lvl="1"/>
+            <a:r>
+              <a:rPr lang="en-US" dirty="0"/>
+              <a:t>3 </a:t>
+            </a:r>
+            <a:r>
+              <a:rPr lang="en-US" dirty="0" err="1"/>
+              <a:t>param</a:t>
+            </a:r>
+            <a:r>
+              <a:rPr lang="en-US" dirty="0"/>
+              <a:t> intuitive model selected for Style Solver (users unlikely to know 7 </a:t>
+            </a:r>
+            <a:r>
+              <a:rPr lang="en-US" dirty="0" err="1"/>
+              <a:t>params</a:t>
+            </a:r>
+            <a:r>
+              <a:rPr lang="en-US" dirty="0"/>
+              <a:t>)</a:t>
+            </a:r>
+          </a:p>
+          <a:p>
+            <a:pPr lvl="2"/>
+            <a:r>
+              <a:rPr lang="en-US" dirty="0"/>
+              <a:t>Chose to show Top 3 potential styles to address lower accuracy</a:t>
+            </a:r>
+          </a:p>
+          <a:p>
+            <a:pPr lvl="1"/>
+            <a:r>
+              <a:rPr lang="en-US" dirty="0"/>
+              <a:t>7 </a:t>
+            </a:r>
+            <a:r>
+              <a:rPr lang="en-US" dirty="0" err="1"/>
+              <a:t>param</a:t>
+            </a:r>
+            <a:r>
+              <a:rPr lang="en-US" dirty="0"/>
+              <a:t> </a:t>
+            </a:r>
+            <a:r>
+              <a:rPr lang="en-US" dirty="0" err="1"/>
+              <a:t>KMeans</a:t>
+            </a:r>
+            <a:r>
+              <a:rPr lang="en-US" dirty="0"/>
+              <a:t> cluster model selected for Recommendations</a:t>
+            </a:r>
+          </a:p>
+          <a:p>
+            <a:r>
+              <a:rPr lang="en-US" dirty="0"/>
+              <a:t>Faced other issues along the way (e.g., overfitting)</a:t>
+            </a:r>
+          </a:p>
+        </p:txBody>
+      </p:sp>
+      <p:graphicFrame>
+        <p:nvGraphicFramePr>
+          <p:cNvPr id="4" name="Table 3">
+            <a:extLst>
+              <a:ext uri="{FF2B5EF4-FFF2-40B4-BE49-F238E27FC236}">
+                <a16:creationId xmlns:a16="http://schemas.microsoft.com/office/drawing/2014/main" id="{E48459CB-3C5E-4DCB-B8A5-E6B2E88FA615}"/>
+              </a:ext>
+            </a:extLst>
+          </p:cNvPr>
+          <p:cNvGraphicFramePr>
+            <a:graphicFrameLocks noGrp="1"/>
+          </p:cNvGraphicFramePr>
+          <p:nvPr>
+            <p:extLst>
+              <p:ext uri="{D42A27DB-BD31-4B8C-83A1-F6EECF244321}">
+                <p14:modId xmlns:p14="http://schemas.microsoft.com/office/powerpoint/2010/main" val="1094399320"/>
+              </p:ext>
+            </p:extLst>
+          </p:nvPr>
+        </p:nvGraphicFramePr>
+        <p:xfrm>
+          <a:off x="680321" y="2131060"/>
+          <a:ext cx="7430463" cy="2595880"/>
+        </p:xfrm>
+        <a:graphic>
+          <a:graphicData uri="http://schemas.openxmlformats.org/drawingml/2006/table">
+            <a:tbl>
+              <a:tblPr firstRow="1" bandRow="1">
+                <a:tableStyleId>{5C22544A-7EE6-4342-B048-85BDC9FD1C3A}</a:tableStyleId>
+              </a:tblPr>
+              <a:tblGrid>
+                <a:gridCol w="986120">
+                  <a:extLst>
+                    <a:ext uri="{9D8B030D-6E8A-4147-A177-3AD203B41FA5}">
+                      <a16:colId xmlns:a16="http://schemas.microsoft.com/office/drawing/2014/main" val="1670566598"/>
+                    </a:ext>
+                  </a:extLst>
+                </a:gridCol>
+                <a:gridCol w="3497942">
+                  <a:extLst>
+                    <a:ext uri="{9D8B030D-6E8A-4147-A177-3AD203B41FA5}">
+                      <a16:colId xmlns:a16="http://schemas.microsoft.com/office/drawing/2014/main" val="2646111768"/>
+                    </a:ext>
+                  </a:extLst>
+                </a:gridCol>
+                <a:gridCol w="1596572">
+                  <a:extLst>
+                    <a:ext uri="{9D8B030D-6E8A-4147-A177-3AD203B41FA5}">
+                      <a16:colId xmlns:a16="http://schemas.microsoft.com/office/drawing/2014/main" val="1862668986"/>
+                    </a:ext>
+                  </a:extLst>
+                </a:gridCol>
+                <a:gridCol w="1349829">
+                  <a:extLst>
+                    <a:ext uri="{9D8B030D-6E8A-4147-A177-3AD203B41FA5}">
+                      <a16:colId xmlns:a16="http://schemas.microsoft.com/office/drawing/2014/main" val="460629345"/>
+                    </a:ext>
+                  </a:extLst>
+                </a:gridCol>
+              </a:tblGrid>
+              <a:tr h="370840">
+                <a:tc>
+                  <a:txBody>
+                    <a:bodyPr/>
+                    <a:lstStyle/>
+                    <a:p>
+                      <a:r>
+                        <a:rPr lang="en-US" dirty="0" err="1"/>
+                        <a:t>Params</a:t>
+                      </a:r>
+                      <a:endParaRPr lang="en-US" dirty="0"/>
+                    </a:p>
+                  </a:txBody>
+                  <a:tcPr/>
+                </a:tc>
+                <a:tc>
+                  <a:txBody>
+                    <a:bodyPr/>
+                    <a:lstStyle/>
+                    <a:p>
+                      <a:r>
+                        <a:rPr lang="en-US" dirty="0"/>
+                        <a:t>Outputs</a:t>
+                      </a:r>
+                    </a:p>
+                  </a:txBody>
+                  <a:tcPr/>
+                </a:tc>
+                <a:tc>
+                  <a:txBody>
+                    <a:bodyPr/>
+                    <a:lstStyle/>
+                    <a:p>
+                      <a:r>
+                        <a:rPr lang="en-US" dirty="0"/>
+                        <a:t>Epochs</a:t>
+                      </a:r>
+                    </a:p>
+                  </a:txBody>
+                  <a:tcPr/>
+                </a:tc>
+                <a:tc>
+                  <a:txBody>
+                    <a:bodyPr/>
+                    <a:lstStyle/>
+                    <a:p>
+                      <a:r>
+                        <a:rPr lang="en-US" dirty="0"/>
+                        <a:t>Accuracy</a:t>
+                      </a:r>
+                    </a:p>
+                  </a:txBody>
+                  <a:tcPr/>
+                </a:tc>
+                <a:extLst>
+                  <a:ext uri="{0D108BD9-81ED-4DB2-BD59-A6C34878D82A}">
+                    <a16:rowId xmlns:a16="http://schemas.microsoft.com/office/drawing/2014/main" val="3387671716"/>
+                  </a:ext>
+                </a:extLst>
+              </a:tr>
+              <a:tr h="370840">
+                <a:tc>
+                  <a:txBody>
+                    <a:bodyPr/>
+                    <a:lstStyle/>
+                    <a:p>
+                      <a:pPr algn="r"/>
+                      <a:r>
+                        <a:rPr lang="en-US" dirty="0"/>
+                        <a:t>3</a:t>
+                      </a:r>
+                    </a:p>
+                  </a:txBody>
+                  <a:tcPr/>
+                </a:tc>
+                <a:tc>
+                  <a:txBody>
+                    <a:bodyPr/>
+                    <a:lstStyle/>
+                    <a:p>
+                      <a:pPr algn="r"/>
+                      <a:r>
+                        <a:rPr lang="en-US" dirty="0"/>
+                        <a:t>13 </a:t>
+                      </a:r>
+                      <a:r>
+                        <a:rPr lang="en-US" dirty="0" err="1"/>
+                        <a:t>Kmeans</a:t>
+                      </a:r>
+                      <a:r>
+                        <a:rPr lang="en-US" dirty="0"/>
+                        <a:t> clusters</a:t>
+                      </a:r>
+                    </a:p>
+                  </a:txBody>
+                  <a:tcPr/>
+                </a:tc>
+                <a:tc>
+                  <a:txBody>
+                    <a:bodyPr/>
+                    <a:lstStyle/>
+                    <a:p>
+                      <a:pPr algn="r"/>
+                      <a:r>
+                        <a:rPr lang="en-US" dirty="0"/>
+                        <a:t>25</a:t>
+                      </a:r>
+                    </a:p>
+                  </a:txBody>
+                  <a:tcPr/>
+                </a:tc>
+                <a:tc>
+                  <a:txBody>
+                    <a:bodyPr/>
+                    <a:lstStyle/>
+                    <a:p>
+                      <a:pPr algn="r"/>
+                      <a:r>
+                        <a:rPr lang="en-US" dirty="0"/>
+                        <a:t>.985</a:t>
+                      </a:r>
+                    </a:p>
+                  </a:txBody>
+                  <a:tcPr/>
+                </a:tc>
+                <a:extLst>
+                  <a:ext uri="{0D108BD9-81ED-4DB2-BD59-A6C34878D82A}">
+                    <a16:rowId xmlns:a16="http://schemas.microsoft.com/office/drawing/2014/main" val="998856832"/>
+                  </a:ext>
+                </a:extLst>
+              </a:tr>
+              <a:tr h="370840">
+                <a:tc>
+                  <a:txBody>
+                    <a:bodyPr/>
+                    <a:lstStyle/>
+                    <a:p>
+                      <a:pPr algn="r"/>
+                      <a:r>
+                        <a:rPr lang="en-US" dirty="0"/>
+                        <a:t>3</a:t>
+                      </a:r>
+                    </a:p>
+                  </a:txBody>
+                  <a:tcPr/>
+                </a:tc>
+                <a:tc>
+                  <a:txBody>
+                    <a:bodyPr/>
+                    <a:lstStyle/>
+                    <a:p>
+                      <a:pPr algn="r"/>
+                      <a:r>
+                        <a:rPr lang="en-US" dirty="0"/>
+                        <a:t>176 styles</a:t>
+                      </a:r>
+                    </a:p>
+                  </a:txBody>
+                  <a:tcPr/>
+                </a:tc>
+                <a:tc>
+                  <a:txBody>
+                    <a:bodyPr/>
+                    <a:lstStyle/>
+                    <a:p>
+                      <a:pPr algn="r"/>
+                      <a:r>
+                        <a:rPr lang="en-US" dirty="0"/>
+                        <a:t>1,000</a:t>
+                      </a:r>
+                    </a:p>
+                  </a:txBody>
+                  <a:tcPr/>
+                </a:tc>
+                <a:tc>
+                  <a:txBody>
+                    <a:bodyPr/>
+                    <a:lstStyle/>
+                    <a:p>
+                      <a:pPr algn="r"/>
+                      <a:r>
+                        <a:rPr lang="en-US" dirty="0"/>
+                        <a:t>.347</a:t>
+                      </a:r>
+                    </a:p>
+                  </a:txBody>
+                  <a:tcPr/>
+                </a:tc>
+                <a:extLst>
+                  <a:ext uri="{0D108BD9-81ED-4DB2-BD59-A6C34878D82A}">
+                    <a16:rowId xmlns:a16="http://schemas.microsoft.com/office/drawing/2014/main" val="1298134571"/>
+                  </a:ext>
+                </a:extLst>
+              </a:tr>
+              <a:tr h="370840">
+                <a:tc>
+                  <a:txBody>
+                    <a:bodyPr/>
+                    <a:lstStyle/>
+                    <a:p>
+                      <a:pPr algn="r"/>
+                      <a:r>
+                        <a:rPr lang="en-US" b="1" dirty="0"/>
+                        <a:t>3</a:t>
+                      </a:r>
+                    </a:p>
+                  </a:txBody>
+                  <a:tcPr>
+                    <a:solidFill>
+                      <a:schemeClr val="accent4">
+                        <a:lumMod val="60000"/>
+                        <a:lumOff val="40000"/>
+                      </a:schemeClr>
+                    </a:solidFill>
+                  </a:tcPr>
+                </a:tc>
+                <a:tc>
+                  <a:txBody>
+                    <a:bodyPr/>
+                    <a:lstStyle/>
+                    <a:p>
+                      <a:pPr algn="r"/>
+                      <a:r>
+                        <a:rPr lang="en-US" b="1" dirty="0"/>
+                        <a:t>11 intuitive categories</a:t>
+                      </a:r>
+                    </a:p>
+                  </a:txBody>
+                  <a:tcPr>
+                    <a:solidFill>
+                      <a:schemeClr val="accent4">
+                        <a:lumMod val="60000"/>
+                        <a:lumOff val="40000"/>
+                      </a:schemeClr>
+                    </a:solidFill>
+                  </a:tcPr>
+                </a:tc>
+                <a:tc>
+                  <a:txBody>
+                    <a:bodyPr/>
+                    <a:lstStyle/>
+                    <a:p>
+                      <a:pPr algn="r"/>
+                      <a:r>
+                        <a:rPr lang="en-US" b="1" dirty="0"/>
+                        <a:t>300</a:t>
+                      </a:r>
+                    </a:p>
+                  </a:txBody>
+                  <a:tcPr>
+                    <a:solidFill>
+                      <a:schemeClr val="accent4">
+                        <a:lumMod val="60000"/>
+                        <a:lumOff val="40000"/>
+                      </a:schemeClr>
+                    </a:solidFill>
+                  </a:tcPr>
+                </a:tc>
+                <a:tc>
+                  <a:txBody>
+                    <a:bodyPr/>
+                    <a:lstStyle/>
+                    <a:p>
+                      <a:pPr algn="r"/>
+                      <a:r>
+                        <a:rPr lang="en-US" b="1" dirty="0"/>
+                        <a:t>.619</a:t>
+                      </a:r>
+                    </a:p>
+                  </a:txBody>
+                  <a:tcPr>
+                    <a:solidFill>
+                      <a:schemeClr val="accent4">
+                        <a:lumMod val="60000"/>
+                        <a:lumOff val="40000"/>
+                      </a:schemeClr>
+                    </a:solidFill>
+                  </a:tcPr>
+                </a:tc>
+                <a:extLst>
+                  <a:ext uri="{0D108BD9-81ED-4DB2-BD59-A6C34878D82A}">
+                    <a16:rowId xmlns:a16="http://schemas.microsoft.com/office/drawing/2014/main" val="2463922112"/>
+                  </a:ext>
+                </a:extLst>
+              </a:tr>
+              <a:tr h="370840">
+                <a:tc>
+                  <a:txBody>
+                    <a:bodyPr/>
+                    <a:lstStyle/>
+                    <a:p>
+                      <a:pPr algn="r"/>
+                      <a:r>
+                        <a:rPr lang="en-US" b="1" dirty="0"/>
+                        <a:t>7</a:t>
+                      </a:r>
+                    </a:p>
+                  </a:txBody>
+                  <a:tcPr>
+                    <a:solidFill>
+                      <a:schemeClr val="accent4">
+                        <a:lumMod val="60000"/>
+                        <a:lumOff val="40000"/>
+                      </a:schemeClr>
+                    </a:solidFill>
+                  </a:tcPr>
+                </a:tc>
+                <a:tc>
+                  <a:txBody>
+                    <a:bodyPr/>
+                    <a:lstStyle/>
+                    <a:p>
+                      <a:pPr algn="r"/>
+                      <a:r>
+                        <a:rPr lang="en-US" b="1" dirty="0"/>
+                        <a:t>13 </a:t>
+                      </a:r>
+                      <a:r>
+                        <a:rPr lang="en-US" b="1" dirty="0" err="1"/>
+                        <a:t>Kmeans</a:t>
+                      </a:r>
+                      <a:r>
+                        <a:rPr lang="en-US" b="1" dirty="0"/>
+                        <a:t> clusters</a:t>
+                      </a:r>
+                    </a:p>
+                  </a:txBody>
+                  <a:tcPr>
+                    <a:solidFill>
+                      <a:schemeClr val="accent4">
+                        <a:lumMod val="60000"/>
+                        <a:lumOff val="40000"/>
+                      </a:schemeClr>
+                    </a:solidFill>
+                  </a:tcPr>
+                </a:tc>
+                <a:tc>
+                  <a:txBody>
+                    <a:bodyPr/>
+                    <a:lstStyle/>
+                    <a:p>
+                      <a:pPr algn="r"/>
+                      <a:r>
+                        <a:rPr lang="en-US" b="1" dirty="0"/>
+                        <a:t>25</a:t>
+                      </a:r>
+                    </a:p>
+                  </a:txBody>
+                  <a:tcPr>
+                    <a:solidFill>
+                      <a:schemeClr val="accent4">
+                        <a:lumMod val="60000"/>
+                        <a:lumOff val="40000"/>
+                      </a:schemeClr>
+                    </a:solidFill>
+                  </a:tcPr>
+                </a:tc>
+                <a:tc>
+                  <a:txBody>
+                    <a:bodyPr/>
+                    <a:lstStyle/>
+                    <a:p>
+                      <a:pPr algn="r"/>
+                      <a:r>
+                        <a:rPr lang="en-US" b="1" dirty="0"/>
+                        <a:t>.992</a:t>
+                      </a:r>
+                    </a:p>
+                  </a:txBody>
+                  <a:tcPr>
+                    <a:solidFill>
+                      <a:schemeClr val="accent4">
+                        <a:lumMod val="60000"/>
+                        <a:lumOff val="40000"/>
+                      </a:schemeClr>
+                    </a:solidFill>
+                  </a:tcPr>
+                </a:tc>
+                <a:extLst>
+                  <a:ext uri="{0D108BD9-81ED-4DB2-BD59-A6C34878D82A}">
+                    <a16:rowId xmlns:a16="http://schemas.microsoft.com/office/drawing/2014/main" val="3019608244"/>
+                  </a:ext>
+                </a:extLst>
+              </a:tr>
+              <a:tr h="370840">
+                <a:tc>
+                  <a:txBody>
+                    <a:bodyPr/>
+                    <a:lstStyle/>
+                    <a:p>
+                      <a:pPr algn="r"/>
+                      <a:r>
+                        <a:rPr lang="en-US" dirty="0"/>
+                        <a:t>7</a:t>
+                      </a:r>
+                    </a:p>
+                  </a:txBody>
+                  <a:tcPr/>
+                </a:tc>
+                <a:tc>
+                  <a:txBody>
+                    <a:bodyPr/>
+                    <a:lstStyle/>
+                    <a:p>
+                      <a:pPr algn="r"/>
+                      <a:r>
+                        <a:rPr lang="en-US" dirty="0"/>
+                        <a:t>176 styles</a:t>
+                      </a:r>
+                    </a:p>
+                  </a:txBody>
+                  <a:tcPr/>
+                </a:tc>
+                <a:tc>
+                  <a:txBody>
+                    <a:bodyPr/>
+                    <a:lstStyle/>
+                    <a:p>
+                      <a:pPr algn="r"/>
+                      <a:r>
+                        <a:rPr lang="en-US" dirty="0"/>
+                        <a:t>1,000</a:t>
+                      </a:r>
+                    </a:p>
+                  </a:txBody>
+                  <a:tcPr/>
+                </a:tc>
+                <a:tc>
+                  <a:txBody>
+                    <a:bodyPr/>
+                    <a:lstStyle/>
+                    <a:p>
+                      <a:pPr algn="r"/>
+                      <a:r>
+                        <a:rPr lang="en-US" dirty="0"/>
+                        <a:t>.4767</a:t>
+                      </a:r>
+                    </a:p>
+                  </a:txBody>
+                  <a:tcPr/>
+                </a:tc>
+                <a:extLst>
+                  <a:ext uri="{0D108BD9-81ED-4DB2-BD59-A6C34878D82A}">
+                    <a16:rowId xmlns:a16="http://schemas.microsoft.com/office/drawing/2014/main" val="589023000"/>
+                  </a:ext>
+                </a:extLst>
+              </a:tr>
+              <a:tr h="370840">
+                <a:tc>
+                  <a:txBody>
+                    <a:bodyPr/>
+                    <a:lstStyle/>
+                    <a:p>
+                      <a:pPr algn="r"/>
+                      <a:r>
+                        <a:rPr lang="en-US" dirty="0"/>
+                        <a:t>7</a:t>
+                      </a:r>
+                    </a:p>
+                  </a:txBody>
+                  <a:tcPr/>
+                </a:tc>
+                <a:tc>
+                  <a:txBody>
+                    <a:bodyPr/>
+                    <a:lstStyle/>
+                    <a:p>
+                      <a:pPr algn="r"/>
+                      <a:r>
+                        <a:rPr lang="en-US" dirty="0"/>
+                        <a:t>11 intuitive categories</a:t>
+                      </a:r>
+                    </a:p>
+                  </a:txBody>
+                  <a:tcPr/>
+                </a:tc>
+                <a:tc>
+                  <a:txBody>
+                    <a:bodyPr/>
+                    <a:lstStyle/>
+                    <a:p>
+                      <a:pPr algn="r"/>
+                      <a:r>
+                        <a:rPr lang="en-US" dirty="0"/>
+                        <a:t>300</a:t>
+                      </a:r>
+                    </a:p>
+                  </a:txBody>
+                  <a:tcPr/>
+                </a:tc>
+                <a:tc>
+                  <a:txBody>
+                    <a:bodyPr/>
+                    <a:lstStyle/>
+                    <a:p>
+                      <a:pPr algn="r"/>
+                      <a:r>
+                        <a:rPr lang="en-US" dirty="0"/>
+                        <a:t>.690</a:t>
+                      </a:r>
+                    </a:p>
+                  </a:txBody>
+                  <a:tcPr/>
+                </a:tc>
+                <a:extLst>
+                  <a:ext uri="{0D108BD9-81ED-4DB2-BD59-A6C34878D82A}">
+                    <a16:rowId xmlns:a16="http://schemas.microsoft.com/office/drawing/2014/main" val="4288525378"/>
+                  </a:ext>
+                </a:extLst>
+              </a:tr>
+            </a:tbl>
+          </a:graphicData>
+        </a:graphic>
+      </p:graphicFrame>
+    </p:spTree>
+    <p:extLst>
+      <p:ext uri="{BB962C8B-B14F-4D97-AF65-F5344CB8AC3E}">
+        <p14:creationId xmlns:p14="http://schemas.microsoft.com/office/powerpoint/2010/main" val="4268266094"/>
+      </p:ext>
+    </p:extLst>
+  </p:cSld>
+  <p:clrMapOvr>
+    <a:masterClrMapping/>
+  </p:clrMapOvr>
+</p:sld>
+</file>
+
+<file path=ppt/slides/slide14.xml><?xml version="1.0" encoding="utf-8"?>
+<p:sld xmlns:a="http://schemas.openxmlformats.org/drawingml/2006/main" xmlns:r="http://schemas.openxmlformats.org/officeDocument/2006/relationships" xmlns:p="http://schemas.openxmlformats.org/presentationml/2006/main">
+  <p:cSld>
+    <p:spTree>
+      <p:nvGrpSpPr>
+        <p:cNvPr id="1" name=""/>
+        <p:cNvGrpSpPr/>
+        <p:nvPr/>
+      </p:nvGrpSpPr>
+      <p:grpSpPr>
+        <a:xfrm>
+          <a:off x="0" y="0"/>
+          <a:ext cx="0" cy="0"/>
+          <a:chOff x="0" y="0"/>
+          <a:chExt cx="0" cy="0"/>
+        </a:xfrm>
+      </p:grpSpPr>
+      <p:sp>
+        <p:nvSpPr>
+          <p:cNvPr id="2" name="Title 1">
+            <a:extLst>
+              <a:ext uri="{FF2B5EF4-FFF2-40B4-BE49-F238E27FC236}">
                 <a16:creationId xmlns:a16="http://schemas.microsoft.com/office/drawing/2014/main" id="{2053F771-CD50-420F-95AC-12A2253A0620}"/>
               </a:ext>
             </a:extLst>
@@ -9408,9 +10927,12 @@
               <a:buNone/>
             </a:pPr>
             <a:r>
-              <a:rPr lang="en-US" dirty="0"/>
-              <a:t>[Insert Link]</a:t>
-            </a:r>
+              <a:rPr lang="en-US" dirty="0">
+                <a:hlinkClick r:id="rId3"/>
+              </a:rPr>
+              <a:t>App on Heroku</a:t>
+            </a:r>
+            <a:endParaRPr lang="en-US" dirty="0"/>
           </a:p>
         </p:txBody>
       </p:sp>
@@ -9427,7 +10949,7 @@
 </p:sld>
 </file>
 
-<file path=ppt/slides/slide14.xml><?xml version="1.0" encoding="utf-8"?>
+<file path=ppt/slides/slide15.xml><?xml version="1.0" encoding="utf-8"?>
 <p:sld xmlns:a="http://schemas.openxmlformats.org/drawingml/2006/main" xmlns:r="http://schemas.openxmlformats.org/officeDocument/2006/relationships" xmlns:p="http://schemas.openxmlformats.org/presentationml/2006/main">
   <p:cSld>
     <p:spTree>
@@ -9606,9 +11128,12 @@
               <a:buNone/>
             </a:pPr>
             <a:r>
-              <a:rPr lang="en-US" dirty="0"/>
-              <a:t>[Insert Link]</a:t>
-            </a:r>
+              <a:rPr lang="en-US" dirty="0">
+                <a:hlinkClick r:id="rId3"/>
+              </a:rPr>
+              <a:t>Heroku App</a:t>
+            </a:r>
+            <a:endParaRPr lang="en-US" dirty="0"/>
           </a:p>
         </p:txBody>
       </p:sp>
@@ -9704,7 +11229,7 @@
             </a:r>
             <a:r>
               <a:rPr lang="en-US" dirty="0">
-                <a:hlinkClick r:id="rId2"/>
+                <a:hlinkClick r:id="rId3"/>
               </a:rPr>
               <a:t>[Link]</a:t>
             </a:r>
@@ -9829,7 +11354,7 @@
           <p:nvPr/>
         </p:nvPicPr>
         <p:blipFill>
-          <a:blip r:embed="rId3"/>
+          <a:blip r:embed="rId4"/>
           <a:stretch>
             <a:fillRect/>
           </a:stretch>
@@ -9859,7 +11384,7 @@
           <p:nvPr/>
         </p:nvPicPr>
         <p:blipFill>
-          <a:blip r:embed="rId4">
+          <a:blip r:embed="rId5">
             <a:extLst>
               <a:ext uri="{28A0092B-C50C-407E-A947-70E740481C1C}">
                 <a14:useLocalDpi xmlns:a14="http://schemas.microsoft.com/office/drawing/2010/main" val="0"/>

</xml_diff>